<commit_message>
Updated UG, DG, PPP. Updated readme to reflect changes to the app more accurately Fixed allignment of some error messages.
</commit_message>
<xml_diff>
--- a/docs/diagrams/CompositeDesignPattern.pptx
+++ b/docs/diagrams/CompositeDesignPattern.pptx
@@ -210,7 +210,7 @@
             <a:fld id="{F5CC4B3F-88C1-4FFA-B1B6-F41C21DC6924}" type="datetimeFigureOut">
               <a:rPr lang="en-US" smtClean="0"/>
               <a:pPr/>
-              <a:t>4/11/2019</a:t>
+              <a:t>4/14/2019</a:t>
             </a:fld>
             <a:endParaRPr lang="en-US"/>
           </a:p>
@@ -658,7 +658,7 @@
             <a:fld id="{78C97017-6FC3-485B-9764-EAC9E56C1D49}" type="datetimeFigureOut">
               <a:rPr lang="en-US" smtClean="0"/>
               <a:pPr/>
-              <a:t>4/11/2019</a:t>
+              <a:t>4/14/2019</a:t>
             </a:fld>
             <a:endParaRPr lang="en-US"/>
           </a:p>
@@ -828,7 +828,7 @@
             <a:fld id="{78C97017-6FC3-485B-9764-EAC9E56C1D49}" type="datetimeFigureOut">
               <a:rPr lang="en-US" smtClean="0"/>
               <a:pPr/>
-              <a:t>4/11/2019</a:t>
+              <a:t>4/14/2019</a:t>
             </a:fld>
             <a:endParaRPr lang="en-US"/>
           </a:p>
@@ -1008,7 +1008,7 @@
             <a:fld id="{78C97017-6FC3-485B-9764-EAC9E56C1D49}" type="datetimeFigureOut">
               <a:rPr lang="en-US" smtClean="0"/>
               <a:pPr/>
-              <a:t>4/11/2019</a:t>
+              <a:t>4/14/2019</a:t>
             </a:fld>
             <a:endParaRPr lang="en-US"/>
           </a:p>
@@ -1178,7 +1178,7 @@
             <a:fld id="{78C97017-6FC3-485B-9764-EAC9E56C1D49}" type="datetimeFigureOut">
               <a:rPr lang="en-US" smtClean="0"/>
               <a:pPr/>
-              <a:t>4/11/2019</a:t>
+              <a:t>4/14/2019</a:t>
             </a:fld>
             <a:endParaRPr lang="en-US"/>
           </a:p>
@@ -1425,7 +1425,7 @@
             <a:fld id="{78C97017-6FC3-485B-9764-EAC9E56C1D49}" type="datetimeFigureOut">
               <a:rPr lang="en-US" smtClean="0"/>
               <a:pPr/>
-              <a:t>4/11/2019</a:t>
+              <a:t>4/14/2019</a:t>
             </a:fld>
             <a:endParaRPr lang="en-US"/>
           </a:p>
@@ -1712,7 +1712,7 @@
             <a:fld id="{78C97017-6FC3-485B-9764-EAC9E56C1D49}" type="datetimeFigureOut">
               <a:rPr lang="en-US" smtClean="0"/>
               <a:pPr/>
-              <a:t>4/11/2019</a:t>
+              <a:t>4/14/2019</a:t>
             </a:fld>
             <a:endParaRPr lang="en-US"/>
           </a:p>
@@ -2133,7 +2133,7 @@
             <a:fld id="{78C97017-6FC3-485B-9764-EAC9E56C1D49}" type="datetimeFigureOut">
               <a:rPr lang="en-US" smtClean="0"/>
               <a:pPr/>
-              <a:t>4/11/2019</a:t>
+              <a:t>4/14/2019</a:t>
             </a:fld>
             <a:endParaRPr lang="en-US"/>
           </a:p>
@@ -2252,7 +2252,7 @@
             <a:fld id="{78C97017-6FC3-485B-9764-EAC9E56C1D49}" type="datetimeFigureOut">
               <a:rPr lang="en-US" smtClean="0"/>
               <a:pPr/>
-              <a:t>4/11/2019</a:t>
+              <a:t>4/14/2019</a:t>
             </a:fld>
             <a:endParaRPr lang="en-US"/>
           </a:p>
@@ -2349,7 +2349,7 @@
             <a:fld id="{78C97017-6FC3-485B-9764-EAC9E56C1D49}" type="datetimeFigureOut">
               <a:rPr lang="en-US" smtClean="0"/>
               <a:pPr/>
-              <a:t>4/11/2019</a:t>
+              <a:t>4/14/2019</a:t>
             </a:fld>
             <a:endParaRPr lang="en-US"/>
           </a:p>
@@ -2626,7 +2626,7 @@
             <a:fld id="{78C97017-6FC3-485B-9764-EAC9E56C1D49}" type="datetimeFigureOut">
               <a:rPr lang="en-US" smtClean="0"/>
               <a:pPr/>
-              <a:t>4/11/2019</a:t>
+              <a:t>4/14/2019</a:t>
             </a:fld>
             <a:endParaRPr lang="en-US"/>
           </a:p>
@@ -2880,7 +2880,7 @@
             <a:fld id="{78C97017-6FC3-485B-9764-EAC9E56C1D49}" type="datetimeFigureOut">
               <a:rPr lang="en-US" smtClean="0"/>
               <a:pPr/>
-              <a:t>4/11/2019</a:t>
+              <a:t>4/14/2019</a:t>
             </a:fld>
             <a:endParaRPr lang="en-US"/>
           </a:p>
@@ -3093,7 +3093,7 @@
             <a:fld id="{78C97017-6FC3-485B-9764-EAC9E56C1D49}" type="datetimeFigureOut">
               <a:rPr lang="en-US" smtClean="0"/>
               <a:pPr/>
-              <a:t>4/11/2019</a:t>
+              <a:t>4/14/2019</a:t>
             </a:fld>
             <a:endParaRPr lang="en-US"/>
           </a:p>
@@ -4620,10 +4620,10 @@
         </p:nvGrpSpPr>
         <p:grpSpPr>
           <a:xfrm>
-            <a:off x="1725008" y="827230"/>
-            <a:ext cx="6222407" cy="4026503"/>
-            <a:chOff x="1725008" y="827230"/>
-            <a:chExt cx="6222407" cy="4026503"/>
+            <a:off x="1671422" y="1295400"/>
+            <a:ext cx="6329578" cy="2701036"/>
+            <a:chOff x="1671422" y="1295400"/>
+            <a:chExt cx="6329578" cy="2701036"/>
           </a:xfrm>
         </p:grpSpPr>
         <p:grpSp>
@@ -4640,10 +4640,10 @@
           </p:nvGrpSpPr>
           <p:grpSpPr>
             <a:xfrm>
-              <a:off x="1725008" y="827230"/>
-              <a:ext cx="6222407" cy="4026503"/>
-              <a:chOff x="1725008" y="827230"/>
-              <a:chExt cx="6222407" cy="4026503"/>
+              <a:off x="1671422" y="1295400"/>
+              <a:ext cx="6329578" cy="2701036"/>
+              <a:chOff x="1671422" y="1295400"/>
+              <a:chExt cx="6329578" cy="2701036"/>
             </a:xfrm>
           </p:grpSpPr>
           <p:sp>
@@ -4660,8 +4660,8 @@
             </p:nvSpPr>
             <p:spPr>
               <a:xfrm>
-                <a:off x="1725008" y="827230"/>
-                <a:ext cx="6222407" cy="4026503"/>
+                <a:off x="1671422" y="1295400"/>
+                <a:ext cx="6329578" cy="2701036"/>
               </a:xfrm>
               <a:prstGeom prst="roundRect">
                 <a:avLst>

</xml_diff>